<commit_message>
Minor changes to August 2015 presentation
</commit_message>
<xml_diff>
--- a/SpinWaveExcitationsInFe.pptx
+++ b/SpinWaveExcitationsInFe.pptx
@@ -294,7 +294,7 @@
           <a:p>
             <a:fld id="{2BB24526-D561-41AA-952F-4B4451167233}" type="datetimeFigureOut">
               <a:rPr lang="en-GB" smtClean="0"/>
-              <a:t>24/07/2015</a:t>
+              <a:t>27/07/2015</a:t>
             </a:fld>
             <a:endParaRPr lang="en-GB"/>
           </a:p>
@@ -464,7 +464,7 @@
           <a:p>
             <a:fld id="{2BB24526-D561-41AA-952F-4B4451167233}" type="datetimeFigureOut">
               <a:rPr lang="en-GB" smtClean="0"/>
-              <a:t>24/07/2015</a:t>
+              <a:t>27/07/2015</a:t>
             </a:fld>
             <a:endParaRPr lang="en-GB"/>
           </a:p>
@@ -644,7 +644,7 @@
           <a:p>
             <a:fld id="{2BB24526-D561-41AA-952F-4B4451167233}" type="datetimeFigureOut">
               <a:rPr lang="en-GB" smtClean="0"/>
-              <a:t>24/07/2015</a:t>
+              <a:t>27/07/2015</a:t>
             </a:fld>
             <a:endParaRPr lang="en-GB"/>
           </a:p>
@@ -814,7 +814,7 @@
           <a:p>
             <a:fld id="{2BB24526-D561-41AA-952F-4B4451167233}" type="datetimeFigureOut">
               <a:rPr lang="en-GB" smtClean="0"/>
-              <a:t>24/07/2015</a:t>
+              <a:t>27/07/2015</a:t>
             </a:fld>
             <a:endParaRPr lang="en-GB"/>
           </a:p>
@@ -1060,7 +1060,7 @@
           <a:p>
             <a:fld id="{2BB24526-D561-41AA-952F-4B4451167233}" type="datetimeFigureOut">
               <a:rPr lang="en-GB" smtClean="0"/>
-              <a:t>24/07/2015</a:t>
+              <a:t>27/07/2015</a:t>
             </a:fld>
             <a:endParaRPr lang="en-GB"/>
           </a:p>
@@ -1348,7 +1348,7 @@
           <a:p>
             <a:fld id="{2BB24526-D561-41AA-952F-4B4451167233}" type="datetimeFigureOut">
               <a:rPr lang="en-GB" smtClean="0"/>
-              <a:t>24/07/2015</a:t>
+              <a:t>27/07/2015</a:t>
             </a:fld>
             <a:endParaRPr lang="en-GB"/>
           </a:p>
@@ -1770,7 +1770,7 @@
           <a:p>
             <a:fld id="{2BB24526-D561-41AA-952F-4B4451167233}" type="datetimeFigureOut">
               <a:rPr lang="en-GB" smtClean="0"/>
-              <a:t>24/07/2015</a:t>
+              <a:t>27/07/2015</a:t>
             </a:fld>
             <a:endParaRPr lang="en-GB"/>
           </a:p>
@@ -1888,7 +1888,7 @@
           <a:p>
             <a:fld id="{2BB24526-D561-41AA-952F-4B4451167233}" type="datetimeFigureOut">
               <a:rPr lang="en-GB" smtClean="0"/>
-              <a:t>24/07/2015</a:t>
+              <a:t>27/07/2015</a:t>
             </a:fld>
             <a:endParaRPr lang="en-GB"/>
           </a:p>
@@ -1983,7 +1983,7 @@
           <a:p>
             <a:fld id="{2BB24526-D561-41AA-952F-4B4451167233}" type="datetimeFigureOut">
               <a:rPr lang="en-GB" smtClean="0"/>
-              <a:t>24/07/2015</a:t>
+              <a:t>27/07/2015</a:t>
             </a:fld>
             <a:endParaRPr lang="en-GB"/>
           </a:p>
@@ -2260,7 +2260,7 @@
           <a:p>
             <a:fld id="{2BB24526-D561-41AA-952F-4B4451167233}" type="datetimeFigureOut">
               <a:rPr lang="en-GB" smtClean="0"/>
-              <a:t>24/07/2015</a:t>
+              <a:t>27/07/2015</a:t>
             </a:fld>
             <a:endParaRPr lang="en-GB"/>
           </a:p>
@@ -2513,7 +2513,7 @@
           <a:p>
             <a:fld id="{2BB24526-D561-41AA-952F-4B4451167233}" type="datetimeFigureOut">
               <a:rPr lang="en-GB" smtClean="0"/>
-              <a:t>24/07/2015</a:t>
+              <a:t>27/07/2015</a:t>
             </a:fld>
             <a:endParaRPr lang="en-GB"/>
           </a:p>
@@ -2726,7 +2726,7 @@
           <a:p>
             <a:fld id="{2BB24526-D561-41AA-952F-4B4451167233}" type="datetimeFigureOut">
               <a:rPr lang="en-GB" smtClean="0"/>
-              <a:t>24/07/2015</a:t>
+              <a:t>27/07/2015</a:t>
             </a:fld>
             <a:endParaRPr lang="en-GB"/>
           </a:p>
@@ -3723,11 +3723,7 @@
           <a:p>
             <a:r>
               <a:rPr lang="en-GB" dirty="0" smtClean="0"/>
-              <a:t>energies </a:t>
-            </a:r>
-            <a:r>
-              <a:rPr lang="en-GB" dirty="0" smtClean="0"/>
-              <a:t>of 0.2, 0.4, 0.8 and 1.4Ev.</a:t>
+              <a:t>energies of 0.2, 0.4, 0.8 and 1.4Ev.</a:t>
             </a:r>
             <a:endParaRPr lang="en-GB" dirty="0"/>
           </a:p>
@@ -3799,11 +3795,7 @@
           <a:p>
             <a:r>
               <a:rPr lang="en-GB" dirty="0" smtClean="0"/>
-              <a:t>resolution </a:t>
-            </a:r>
-            <a:r>
-              <a:rPr lang="en-GB" dirty="0" smtClean="0"/>
-              <a:t>effects.</a:t>
+              <a:t>resolution effects.</a:t>
             </a:r>
             <a:endParaRPr lang="en-GB" dirty="0"/>
           </a:p>
@@ -4055,11 +4047,7 @@
           <a:p>
             <a:r>
               <a:rPr lang="en-GB" sz="2800" dirty="0" smtClean="0"/>
-              <a:t>DFT&amp;MFT&amp;</a:t>
-            </a:r>
-            <a:r>
-              <a:rPr lang="en-GB" sz="2800" dirty="0" smtClean="0"/>
-              <a:t>BT-consistent SW cap in &lt;1/2,1/2,0&gt;</a:t>
+              <a:t>DFT&amp;MFT&amp;BT-consistent SW cap in &lt;1/2,1/2,0&gt;</a:t>
             </a:r>
             <a:endParaRPr lang="en-GB" sz="2800" dirty="0"/>
           </a:p>
@@ -4088,7 +4076,7 @@
         </p:blipFill>
         <p:spPr bwMode="auto">
           <a:xfrm>
-            <a:off x="165375" y="1628800"/>
+            <a:off x="165375" y="980728"/>
             <a:ext cx="4127081" cy="3769296"/>
           </a:xfrm>
           <a:prstGeom prst="rect">
@@ -4556,6 +4544,96 @@
           </a:fontRef>
         </p:style>
       </p:cxnSp>
+      <p:sp>
+        <p:nvSpPr>
+          <p:cNvPr id="3" name="TextBox 2"/>
+          <p:cNvSpPr txBox="1"/>
+          <p:nvPr/>
+        </p:nvSpPr>
+        <p:spPr>
+          <a:xfrm>
+            <a:off x="3879179" y="4283804"/>
+            <a:ext cx="1184940" cy="369332"/>
+          </a:xfrm>
+          <a:prstGeom prst="rect">
+            <a:avLst/>
+          </a:prstGeom>
+          <a:noFill/>
+        </p:spPr>
+        <p:txBody>
+          <a:bodyPr wrap="none" rtlCol="0">
+            <a:spAutoFit/>
+          </a:bodyPr>
+          <a:lstStyle/>
+          <a:p>
+            <a:r>
+              <a:rPr lang="en-GB" dirty="0" smtClean="0"/>
+              <a:t>E=200-250</a:t>
+            </a:r>
+            <a:endParaRPr lang="en-GB" dirty="0"/>
+          </a:p>
+        </p:txBody>
+      </p:sp>
+      <p:sp>
+        <p:nvSpPr>
+          <p:cNvPr id="16" name="TextBox 15"/>
+          <p:cNvSpPr txBox="1"/>
+          <p:nvPr/>
+        </p:nvSpPr>
+        <p:spPr>
+          <a:xfrm>
+            <a:off x="5403284" y="4293096"/>
+            <a:ext cx="1184940" cy="369332"/>
+          </a:xfrm>
+          <a:prstGeom prst="rect">
+            <a:avLst/>
+          </a:prstGeom>
+          <a:noFill/>
+        </p:spPr>
+        <p:txBody>
+          <a:bodyPr wrap="none" rtlCol="0">
+            <a:spAutoFit/>
+          </a:bodyPr>
+          <a:lstStyle/>
+          <a:p>
+            <a:r>
+              <a:rPr lang="en-GB" dirty="0" smtClean="0"/>
+              <a:t>E=250-300</a:t>
+            </a:r>
+            <a:endParaRPr lang="en-GB" dirty="0"/>
+          </a:p>
+        </p:txBody>
+      </p:sp>
+      <p:sp>
+        <p:nvSpPr>
+          <p:cNvPr id="17" name="TextBox 16"/>
+          <p:cNvSpPr txBox="1"/>
+          <p:nvPr/>
+        </p:nvSpPr>
+        <p:spPr>
+          <a:xfrm>
+            <a:off x="6876256" y="4283804"/>
+            <a:ext cx="1184940" cy="369332"/>
+          </a:xfrm>
+          <a:prstGeom prst="rect">
+            <a:avLst/>
+          </a:prstGeom>
+          <a:noFill/>
+        </p:spPr>
+        <p:txBody>
+          <a:bodyPr wrap="none" rtlCol="0">
+            <a:spAutoFit/>
+          </a:bodyPr>
+          <a:lstStyle/>
+          <a:p>
+            <a:r>
+              <a:rPr lang="en-GB" dirty="0" smtClean="0"/>
+              <a:t>E=300-350</a:t>
+            </a:r>
+            <a:endParaRPr lang="en-GB" dirty="0"/>
+          </a:p>
+        </p:txBody>
+      </p:sp>
     </p:spTree>
     <p:extLst>
       <p:ext uri="{BB962C8B-B14F-4D97-AF65-F5344CB8AC3E}">
@@ -4889,11 +4967,7 @@
           <a:p>
             <a:r>
               <a:rPr lang="en-GB" i="1" dirty="0" smtClean="0"/>
-              <a:t>|D</a:t>
-            </a:r>
-            <a:r>
-              <a:rPr lang="en-GB" i="1" dirty="0" smtClean="0"/>
-              <a:t>|=</a:t>
+              <a:t>|D|=</a:t>
             </a:r>
             <a:r>
               <a:rPr lang="en-GB" dirty="0" smtClean="0"/>
@@ -4935,7 +5009,7 @@
         </p:nvSpPr>
         <p:spPr>
           <a:xfrm>
-            <a:off x="6156176" y="2564903"/>
+            <a:off x="6139760" y="2482844"/>
             <a:ext cx="2583784" cy="646331"/>
           </a:xfrm>
           <a:prstGeom prst="rect">
@@ -5162,6 +5236,9 @@
             <a:avLst/>
           </a:prstGeom>
           <a:ln>
+            <a:solidFill>
+              <a:srgbClr val="FF0000"/>
+            </a:solidFill>
             <a:tailEnd type="arrow"/>
           </a:ln>
         </p:spPr>
@@ -5195,6 +5272,9 @@
             <a:avLst/>
           </a:prstGeom>
           <a:ln>
+            <a:solidFill>
+              <a:srgbClr val="FF0000"/>
+            </a:solidFill>
             <a:tailEnd type="arrow"/>
           </a:ln>
         </p:spPr>
@@ -5228,6 +5308,9 @@
             <a:avLst/>
           </a:prstGeom>
           <a:ln>
+            <a:solidFill>
+              <a:srgbClr val="FF0000"/>
+            </a:solidFill>
             <a:tailEnd type="arrow"/>
           </a:ln>
         </p:spPr>
@@ -5255,12 +5338,15 @@
         <p:spPr>
           <a:xfrm>
             <a:off x="4740248" y="3191775"/>
-            <a:ext cx="1376000" cy="957305"/>
+            <a:ext cx="1291275" cy="914233"/>
           </a:xfrm>
           <a:prstGeom prst="straightConnector1">
             <a:avLst/>
           </a:prstGeom>
           <a:ln>
+            <a:solidFill>
+              <a:srgbClr val="FF0000"/>
+            </a:solidFill>
             <a:tailEnd type="arrow"/>
           </a:ln>
         </p:spPr>
@@ -5287,7 +5373,7 @@
         </p:nvSpPr>
         <p:spPr>
           <a:xfrm>
-            <a:off x="4355976" y="2636912"/>
+            <a:off x="4413207" y="2821578"/>
             <a:ext cx="562975" cy="369332"/>
           </a:xfrm>
           <a:prstGeom prst="rect">
@@ -5304,6 +5390,36 @@
             <a:r>
               <a:rPr lang="en-GB" dirty="0" smtClean="0"/>
               <a:t>Gap</a:t>
+            </a:r>
+            <a:endParaRPr lang="en-GB" dirty="0"/>
+          </a:p>
+        </p:txBody>
+      </p:sp>
+      <p:sp>
+        <p:nvSpPr>
+          <p:cNvPr id="17" name="TextBox 16"/>
+          <p:cNvSpPr txBox="1"/>
+          <p:nvPr/>
+        </p:nvSpPr>
+        <p:spPr>
+          <a:xfrm>
+            <a:off x="1547664" y="5157192"/>
+            <a:ext cx="2282356" cy="369332"/>
+          </a:xfrm>
+          <a:prstGeom prst="rect">
+            <a:avLst/>
+          </a:prstGeom>
+          <a:noFill/>
+        </p:spPr>
+        <p:txBody>
+          <a:bodyPr wrap="none" rtlCol="0">
+            <a:spAutoFit/>
+          </a:bodyPr>
+          <a:lstStyle/>
+          <a:p>
+            <a:r>
+              <a:rPr lang="en-GB" dirty="0" smtClean="0"/>
+              <a:t>Magnetic FF corrected</a:t>
             </a:r>
             <a:endParaRPr lang="en-GB" dirty="0"/>
           </a:p>
@@ -6071,7 +6187,31 @@
       </a:bgFillStyleLst>
     </a:fmtScheme>
   </a:themeElements>
-  <a:objectDefaults/>
+  <a:objectDefaults>
+    <a:lnDef>
+      <a:spPr>
+        <a:ln>
+          <a:tailEnd type="arrow"/>
+        </a:ln>
+      </a:spPr>
+      <a:bodyPr/>
+      <a:lstStyle/>
+      <a:style>
+        <a:lnRef idx="1">
+          <a:schemeClr val="accent1"/>
+        </a:lnRef>
+        <a:fillRef idx="0">
+          <a:schemeClr val="accent1"/>
+        </a:fillRef>
+        <a:effectRef idx="0">
+          <a:schemeClr val="accent1"/>
+        </a:effectRef>
+        <a:fontRef idx="minor">
+          <a:schemeClr val="tx1"/>
+        </a:fontRef>
+      </a:style>
+    </a:lnDef>
+  </a:objectDefaults>
   <a:extraClrSchemeLst/>
 </a:theme>
 </file>
</xml_diff>

<commit_message>
Minor changes to SpinWaveExcitationsInFe.pptx,
Couple of scripts modified to use new path to data files.


Former-commit-id: e0061649229473c9ceb77e97d808be922950f9d2
</commit_message>
<xml_diff>
--- a/SpinWaveExcitationsInFe.pptx
+++ b/SpinWaveExcitationsInFe.pptx
@@ -4674,7 +4674,12 @@
             <p:ph type="title"/>
           </p:nvPr>
         </p:nvSpPr>
-        <p:spPr/>
+        <p:spPr>
+          <a:xfrm>
+            <a:off x="458688" y="144557"/>
+            <a:ext cx="8229600" cy="1143000"/>
+          </a:xfrm>
+        </p:spPr>
         <p:txBody>
           <a:bodyPr>
             <a:normAutofit/>
@@ -4712,8 +4717,8 @@
         </p:blipFill>
         <p:spPr bwMode="auto">
           <a:xfrm>
-            <a:off x="252160" y="2997192"/>
-            <a:ext cx="2880000" cy="2160000"/>
+            <a:off x="467544" y="2204864"/>
+            <a:ext cx="2400000" cy="1800000"/>
           </a:xfrm>
           <a:prstGeom prst="rect">
             <a:avLst/>
@@ -4776,8 +4781,8 @@
         </p:blipFill>
         <p:spPr bwMode="auto">
           <a:xfrm>
-            <a:off x="3132160" y="2925184"/>
-            <a:ext cx="2880000" cy="2160000"/>
+            <a:off x="3180112" y="2204864"/>
+            <a:ext cx="2400000" cy="1800000"/>
           </a:xfrm>
           <a:prstGeom prst="rect">
             <a:avLst/>
@@ -4840,8 +4845,8 @@
         </p:blipFill>
         <p:spPr bwMode="auto">
           <a:xfrm>
-            <a:off x="5868464" y="2925184"/>
-            <a:ext cx="2880000" cy="2160000"/>
+            <a:off x="6060432" y="2277072"/>
+            <a:ext cx="2400000" cy="1800000"/>
           </a:xfrm>
           <a:prstGeom prst="rect">
             <a:avLst/>
@@ -4889,8 +4894,8 @@
         </p:nvSpPr>
         <p:spPr>
           <a:xfrm>
-            <a:off x="1400961" y="1691516"/>
-            <a:ext cx="4539191" cy="369332"/>
+            <a:off x="467544" y="1322184"/>
+            <a:ext cx="4628960" cy="369332"/>
           </a:xfrm>
           <a:prstGeom prst="rect">
             <a:avLst/>
@@ -4905,7 +4910,15 @@
           <a:p>
             <a:r>
               <a:rPr lang="en-GB" dirty="0" smtClean="0"/>
-              <a:t>Bragg 200, Directions [100] (</a:t>
+              <a:t>Bragg 200, Directions </a:t>
+            </a:r>
+            <a:r>
+              <a:rPr lang="en-GB" dirty="0" smtClean="0"/>
+              <a:t>&lt;100&gt; </a:t>
+            </a:r>
+            <a:r>
+              <a:rPr lang="en-GB" dirty="0" smtClean="0"/>
+              <a:t>(</a:t>
             </a:r>
             <a:r>
               <a:rPr lang="en-GB" dirty="0" smtClean="0">
@@ -4939,14 +4952,14 @@
       </p:sp>
       <p:sp>
         <p:nvSpPr>
-          <p:cNvPr id="9" name="TextBox 8"/>
+          <p:cNvPr id="10" name="TextBox 9"/>
           <p:cNvSpPr txBox="1"/>
           <p:nvPr/>
         </p:nvSpPr>
         <p:spPr>
           <a:xfrm>
-            <a:off x="3632639" y="2485881"/>
-            <a:ext cx="1879041" cy="646331"/>
+            <a:off x="6137221" y="1691516"/>
+            <a:ext cx="2583784" cy="646331"/>
           </a:xfrm>
           <a:prstGeom prst="rect">
             <a:avLst/>
@@ -4960,70 +4973,6 @@
           <a:lstStyle/>
           <a:p>
             <a:r>
-              <a:rPr lang="en-GB" i="1" dirty="0" smtClean="0"/>
-              <a:t>Fitted dispersion </a:t>
-            </a:r>
-          </a:p>
-          <a:p>
-            <a:r>
-              <a:rPr lang="en-GB" i="1" dirty="0" smtClean="0"/>
-              <a:t>|D|=</a:t>
-            </a:r>
-            <a:r>
-              <a:rPr lang="en-GB" dirty="0" smtClean="0"/>
-              <a:t>230 [</a:t>
-            </a:r>
-            <a:r>
-              <a:rPr lang="en-GB" sz="1400" dirty="0" err="1" smtClean="0"/>
-              <a:t>meV</a:t>
-            </a:r>
-            <a:r>
-              <a:rPr lang="en-GB" sz="1400" dirty="0" smtClean="0"/>
-              <a:t>*</a:t>
-            </a:r>
-            <a:r>
-              <a:rPr lang="en-GB" sz="1400" dirty="0" smtClean="0">
-                <a:latin typeface="Symbol" panose="05050102010706020507" pitchFamily="18" charset="2"/>
-              </a:rPr>
-              <a:t>A</a:t>
-            </a:r>
-            <a:r>
-              <a:rPr lang="en-GB" sz="1400" baseline="30000" dirty="0" smtClean="0">
-                <a:latin typeface="Symbol" panose="05050102010706020507" pitchFamily="18" charset="2"/>
-              </a:rPr>
-              <a:t>-2</a:t>
-            </a:r>
-            <a:r>
-              <a:rPr lang="en-GB" dirty="0" smtClean="0"/>
-              <a:t>]</a:t>
-            </a:r>
-            <a:endParaRPr lang="en-GB" dirty="0"/>
-          </a:p>
-        </p:txBody>
-      </p:sp>
-      <p:sp>
-        <p:nvSpPr>
-          <p:cNvPr id="10" name="TextBox 9"/>
-          <p:cNvSpPr txBox="1"/>
-          <p:nvPr/>
-        </p:nvSpPr>
-        <p:spPr>
-          <a:xfrm>
-            <a:off x="6139760" y="2482844"/>
-            <a:ext cx="2583784" cy="646331"/>
-          </a:xfrm>
-          <a:prstGeom prst="rect">
-            <a:avLst/>
-          </a:prstGeom>
-          <a:noFill/>
-        </p:spPr>
-        <p:txBody>
-          <a:bodyPr wrap="none" rtlCol="0">
-            <a:spAutoFit/>
-          </a:bodyPr>
-          <a:lstStyle/>
-          <a:p>
-            <a:r>
               <a:rPr lang="en-GB" dirty="0" smtClean="0"/>
               <a:t>Intensity along dispersion</a:t>
             </a:r>
@@ -5038,71 +4987,16 @@
           </a:p>
         </p:txBody>
       </p:sp>
-    </p:spTree>
-    <p:extLst>
-      <p:ext uri="{BB962C8B-B14F-4D97-AF65-F5344CB8AC3E}">
-        <p14:creationId xmlns:p14="http://schemas.microsoft.com/office/powerpoint/2010/main" val="3752755932"/>
-      </p:ext>
-    </p:extLst>
-  </p:cSld>
-  <p:clrMapOvr>
-    <a:masterClrMapping/>
-  </p:clrMapOvr>
-</p:sld>
-</file>
-
-<file path=ppt/slides/slide6.xml><?xml version="1.0" encoding="utf-8"?>
-<p:sld xmlns:a="http://schemas.openxmlformats.org/drawingml/2006/main" xmlns:r="http://schemas.openxmlformats.org/officeDocument/2006/relationships" xmlns:p="http://schemas.openxmlformats.org/presentationml/2006/main">
-  <p:cSld>
-    <p:spTree>
-      <p:nvGrpSpPr>
-        <p:cNvPr id="1" name=""/>
-        <p:cNvGrpSpPr/>
-        <p:nvPr/>
-      </p:nvGrpSpPr>
-      <p:grpSpPr>
-        <a:xfrm>
-          <a:off x="0" y="0"/>
-          <a:ext cx="0" cy="0"/>
-          <a:chOff x="0" y="0"/>
-          <a:chExt cx="0" cy="0"/>
-        </a:xfrm>
-      </p:grpSpPr>
-      <p:sp>
-        <p:nvSpPr>
-          <p:cNvPr id="2" name="Title 1"/>
-          <p:cNvSpPr>
-            <a:spLocks noGrp="1"/>
-          </p:cNvSpPr>
-          <p:nvPr>
-            <p:ph type="title"/>
-          </p:nvPr>
-        </p:nvSpPr>
-        <p:spPr/>
-        <p:txBody>
-          <a:bodyPr>
-            <a:normAutofit/>
-          </a:bodyPr>
-          <a:lstStyle/>
-          <a:p>
-            <a:r>
-              <a:rPr lang="en-GB" sz="2400" dirty="0" smtClean="0"/>
-              <a:t>Some evidence of narrow hole in &lt;1,0,0&gt; direction (DFT-predicted)?</a:t>
-            </a:r>
-            <a:endParaRPr lang="en-GB" sz="2400" dirty="0"/>
-          </a:p>
-        </p:txBody>
-      </p:sp>
       <p:pic>
         <p:nvPicPr>
-          <p:cNvPr id="4" name="Picture 11"/>
+          <p:cNvPr id="1026" name="Picture 2"/>
           <p:cNvPicPr>
             <a:picLocks noChangeAspect="1" noChangeArrowheads="1"/>
           </p:cNvPicPr>
           <p:nvPr/>
         </p:nvPicPr>
         <p:blipFill>
-          <a:blip r:embed="rId2" cstate="print">
+          <a:blip r:embed="rId5">
             <a:extLst>
               <a:ext uri="{28A0092B-C50C-407E-A947-70E740481C1C}">
                 <a14:useLocalDpi xmlns:a14="http://schemas.microsoft.com/office/drawing/2010/main" val="0"/>
@@ -5116,8 +5010,8 @@
         </p:blipFill>
         <p:spPr bwMode="auto">
           <a:xfrm>
-            <a:off x="1115616" y="2133176"/>
-            <a:ext cx="3443277" cy="2880000"/>
+            <a:off x="370368" y="4581128"/>
+            <a:ext cx="2401432" cy="1800000"/>
           </a:xfrm>
           <a:prstGeom prst="rect">
             <a:avLst/>
@@ -5159,14 +5053,14 @@
       </p:pic>
       <p:pic>
         <p:nvPicPr>
-          <p:cNvPr id="5" name="Picture 13"/>
+          <p:cNvPr id="1028" name="Picture 4"/>
           <p:cNvPicPr>
             <a:picLocks noChangeAspect="1" noChangeArrowheads="1"/>
           </p:cNvPicPr>
           <p:nvPr/>
         </p:nvPicPr>
         <p:blipFill>
-          <a:blip r:embed="rId3" cstate="print">
+          <a:blip r:embed="rId6">
             <a:extLst>
               <a:ext uri="{28A0092B-C50C-407E-A947-70E740481C1C}">
                 <a14:useLocalDpi xmlns:a14="http://schemas.microsoft.com/office/drawing/2010/main" val="0"/>
@@ -5180,8 +5074,8 @@
         </p:blipFill>
         <p:spPr bwMode="auto">
           <a:xfrm>
-            <a:off x="4740248" y="2132856"/>
-            <a:ext cx="2752000" cy="2880000"/>
+            <a:off x="6156176" y="4725144"/>
+            <a:ext cx="2401432" cy="1800000"/>
           </a:xfrm>
           <a:prstGeom prst="rect">
             <a:avLst/>
@@ -5221,160 +5115,16 @@
           </a:extLst>
         </p:spPr>
       </p:pic>
-      <p:cxnSp>
-        <p:nvCxnSpPr>
-          <p:cNvPr id="6" name="Straight Arrow Connector 5"/>
-          <p:cNvCxnSpPr/>
-          <p:nvPr/>
-        </p:nvCxnSpPr>
-        <p:spPr>
-          <a:xfrm>
-            <a:off x="4740248" y="3191775"/>
-            <a:ext cx="1631952" cy="323936"/>
-          </a:xfrm>
-          <a:prstGeom prst="straightConnector1">
-            <a:avLst/>
-          </a:prstGeom>
-          <a:ln>
-            <a:solidFill>
-              <a:srgbClr val="FF0000"/>
-            </a:solidFill>
-            <a:tailEnd type="arrow"/>
-          </a:ln>
-        </p:spPr>
-        <p:style>
-          <a:lnRef idx="1">
-            <a:schemeClr val="accent1"/>
-          </a:lnRef>
-          <a:fillRef idx="0">
-            <a:schemeClr val="accent1"/>
-          </a:fillRef>
-          <a:effectRef idx="0">
-            <a:schemeClr val="accent1"/>
-          </a:effectRef>
-          <a:fontRef idx="minor">
-            <a:schemeClr val="tx1"/>
-          </a:fontRef>
-        </p:style>
-      </p:cxnSp>
-      <p:cxnSp>
-        <p:nvCxnSpPr>
-          <p:cNvPr id="7" name="Straight Arrow Connector 6"/>
-          <p:cNvCxnSpPr/>
-          <p:nvPr/>
-        </p:nvCxnSpPr>
-        <p:spPr>
-          <a:xfrm flipH="1">
-            <a:off x="3450648" y="3191775"/>
-            <a:ext cx="1289600" cy="323936"/>
-          </a:xfrm>
-          <a:prstGeom prst="straightConnector1">
-            <a:avLst/>
-          </a:prstGeom>
-          <a:ln>
-            <a:solidFill>
-              <a:srgbClr val="FF0000"/>
-            </a:solidFill>
-            <a:tailEnd type="arrow"/>
-          </a:ln>
-        </p:spPr>
-        <p:style>
-          <a:lnRef idx="1">
-            <a:schemeClr val="accent1"/>
-          </a:lnRef>
-          <a:fillRef idx="0">
-            <a:schemeClr val="accent1"/>
-          </a:fillRef>
-          <a:effectRef idx="0">
-            <a:schemeClr val="accent1"/>
-          </a:effectRef>
-          <a:fontRef idx="minor">
-            <a:schemeClr val="tx1"/>
-          </a:fontRef>
-        </p:style>
-      </p:cxnSp>
-      <p:cxnSp>
-        <p:nvCxnSpPr>
-          <p:cNvPr id="11" name="Straight Arrow Connector 10"/>
-          <p:cNvCxnSpPr/>
-          <p:nvPr/>
-        </p:nvCxnSpPr>
-        <p:spPr>
-          <a:xfrm flipH="1">
-            <a:off x="2411760" y="3191775"/>
-            <a:ext cx="2328488" cy="1029313"/>
-          </a:xfrm>
-          <a:prstGeom prst="straightConnector1">
-            <a:avLst/>
-          </a:prstGeom>
-          <a:ln>
-            <a:solidFill>
-              <a:srgbClr val="FF0000"/>
-            </a:solidFill>
-            <a:tailEnd type="arrow"/>
-          </a:ln>
-        </p:spPr>
-        <p:style>
-          <a:lnRef idx="1">
-            <a:schemeClr val="accent1"/>
-          </a:lnRef>
-          <a:fillRef idx="0">
-            <a:schemeClr val="accent1"/>
-          </a:fillRef>
-          <a:effectRef idx="0">
-            <a:schemeClr val="accent1"/>
-          </a:effectRef>
-          <a:fontRef idx="minor">
-            <a:schemeClr val="tx1"/>
-          </a:fontRef>
-        </p:style>
-      </p:cxnSp>
-      <p:cxnSp>
-        <p:nvCxnSpPr>
-          <p:cNvPr id="13" name="Straight Arrow Connector 12"/>
-          <p:cNvCxnSpPr/>
-          <p:nvPr/>
-        </p:nvCxnSpPr>
-        <p:spPr>
-          <a:xfrm>
-            <a:off x="4740248" y="3191775"/>
-            <a:ext cx="1291275" cy="914233"/>
-          </a:xfrm>
-          <a:prstGeom prst="straightConnector1">
-            <a:avLst/>
-          </a:prstGeom>
-          <a:ln>
-            <a:solidFill>
-              <a:srgbClr val="FF0000"/>
-            </a:solidFill>
-            <a:tailEnd type="arrow"/>
-          </a:ln>
-        </p:spPr>
-        <p:style>
-          <a:lnRef idx="1">
-            <a:schemeClr val="accent1"/>
-          </a:lnRef>
-          <a:fillRef idx="0">
-            <a:schemeClr val="accent1"/>
-          </a:fillRef>
-          <a:effectRef idx="0">
-            <a:schemeClr val="accent1"/>
-          </a:effectRef>
-          <a:fontRef idx="minor">
-            <a:schemeClr val="tx1"/>
-          </a:fontRef>
-        </p:style>
-      </p:cxnSp>
-      <p:sp>
-        <p:nvSpPr>
-          <p:cNvPr id="14" name="TextBox 13"/>
+      <p:sp>
+        <p:nvSpPr>
+          <p:cNvPr id="12" name="TextBox 11"/>
           <p:cNvSpPr txBox="1"/>
           <p:nvPr/>
         </p:nvSpPr>
         <p:spPr>
           <a:xfrm>
-            <a:off x="4413207" y="2821578"/>
-            <a:ext cx="562975" cy="369332"/>
+            <a:off x="336510" y="4004864"/>
+            <a:ext cx="4628960" cy="369332"/>
           </a:xfrm>
           <a:prstGeom prst="rect">
             <a:avLst/>
@@ -5389,7 +5139,41 @@
           <a:p>
             <a:r>
               <a:rPr lang="en-GB" dirty="0" smtClean="0"/>
-              <a:t>Gap</a:t>
+              <a:t>Bragg 200, Directions </a:t>
+            </a:r>
+            <a:r>
+              <a:rPr lang="en-GB" dirty="0" smtClean="0"/>
+              <a:t>&lt;110&gt; </a:t>
+            </a:r>
+            <a:r>
+              <a:rPr lang="en-GB" dirty="0" smtClean="0"/>
+              <a:t>(</a:t>
+            </a:r>
+            <a:r>
+              <a:rPr lang="en-GB" dirty="0" smtClean="0">
+                <a:latin typeface="Symbol" panose="05050102010706020507" pitchFamily="18" charset="2"/>
+              </a:rPr>
+              <a:t>GN</a:t>
+            </a:r>
+            <a:r>
+              <a:rPr lang="en-GB" dirty="0" smtClean="0"/>
+              <a:t>), </a:t>
+            </a:r>
+            <a:r>
+              <a:rPr lang="en-GB" dirty="0" err="1" smtClean="0"/>
+              <a:t>dE</a:t>
+            </a:r>
+            <a:r>
+              <a:rPr lang="en-GB" dirty="0" smtClean="0"/>
+              <a:t>=5, </a:t>
+            </a:r>
+            <a:r>
+              <a:rPr lang="en-GB" dirty="0" err="1" smtClean="0"/>
+              <a:t>dK</a:t>
+            </a:r>
+            <a:r>
+              <a:rPr lang="en-GB" dirty="0" smtClean="0"/>
+              <a:t>=0.1</a:t>
             </a:r>
             <a:endParaRPr lang="en-GB" dirty="0"/>
           </a:p>
@@ -5397,14 +5181,14 @@
       </p:sp>
       <p:sp>
         <p:nvSpPr>
-          <p:cNvPr id="17" name="TextBox 16"/>
+          <p:cNvPr id="13" name="TextBox 12"/>
           <p:cNvSpPr txBox="1"/>
           <p:nvPr/>
         </p:nvSpPr>
         <p:spPr>
           <a:xfrm>
-            <a:off x="1547664" y="5157192"/>
-            <a:ext cx="2282356" cy="369332"/>
+            <a:off x="3413039" y="1700808"/>
+            <a:ext cx="1879041" cy="646331"/>
           </a:xfrm>
           <a:prstGeom prst="rect">
             <a:avLst/>
@@ -5418,78 +5202,57 @@
           <a:lstStyle/>
           <a:p>
             <a:r>
+              <a:rPr lang="en-GB" i="1" dirty="0" smtClean="0"/>
+              <a:t>Fitted dispersion </a:t>
+            </a:r>
+          </a:p>
+          <a:p>
+            <a:r>
+              <a:rPr lang="en-GB" i="1" dirty="0" smtClean="0"/>
+              <a:t>|D|=</a:t>
+            </a:r>
+            <a:r>
               <a:rPr lang="en-GB" dirty="0" smtClean="0"/>
-              <a:t>Magnetic FF corrected</a:t>
+              <a:t>230 [</a:t>
+            </a:r>
+            <a:r>
+              <a:rPr lang="en-GB" sz="1400" dirty="0" err="1" smtClean="0"/>
+              <a:t>meV</a:t>
+            </a:r>
+            <a:r>
+              <a:rPr lang="en-GB" sz="1400" dirty="0" smtClean="0"/>
+              <a:t>*</a:t>
+            </a:r>
+            <a:r>
+              <a:rPr lang="en-GB" sz="1400" dirty="0" smtClean="0">
+                <a:latin typeface="Symbol" panose="05050102010706020507" pitchFamily="18" charset="2"/>
+              </a:rPr>
+              <a:t>A</a:t>
+            </a:r>
+            <a:r>
+              <a:rPr lang="en-GB" sz="1400" baseline="30000" dirty="0" smtClean="0">
+                <a:latin typeface="Symbol" panose="05050102010706020507" pitchFamily="18" charset="2"/>
+              </a:rPr>
+              <a:t>-2</a:t>
+            </a:r>
+            <a:r>
+              <a:rPr lang="en-GB" dirty="0" smtClean="0"/>
+              <a:t>]</a:t>
             </a:r>
             <a:endParaRPr lang="en-GB" dirty="0"/>
-          </a:p>
-        </p:txBody>
-      </p:sp>
-    </p:spTree>
-    <p:extLst>
-      <p:ext uri="{BB962C8B-B14F-4D97-AF65-F5344CB8AC3E}">
-        <p14:creationId xmlns:p14="http://schemas.microsoft.com/office/powerpoint/2010/main" val="3533390486"/>
-      </p:ext>
-    </p:extLst>
-  </p:cSld>
-  <p:clrMapOvr>
-    <a:masterClrMapping/>
-  </p:clrMapOvr>
-</p:sld>
-</file>
-
-<file path=ppt/slides/slide7.xml><?xml version="1.0" encoding="utf-8"?>
-<p:sld xmlns:a="http://schemas.openxmlformats.org/drawingml/2006/main" xmlns:r="http://schemas.openxmlformats.org/officeDocument/2006/relationships" xmlns:p="http://schemas.openxmlformats.org/presentationml/2006/main">
-  <p:cSld>
-    <p:spTree>
-      <p:nvGrpSpPr>
-        <p:cNvPr id="1" name=""/>
-        <p:cNvGrpSpPr/>
-        <p:nvPr/>
-      </p:nvGrpSpPr>
-      <p:grpSpPr>
-        <a:xfrm>
-          <a:off x="0" y="0"/>
-          <a:ext cx="0" cy="0"/>
-          <a:chOff x="0" y="0"/>
-          <a:chExt cx="0" cy="0"/>
-        </a:xfrm>
-      </p:grpSpPr>
-      <p:sp>
-        <p:nvSpPr>
-          <p:cNvPr id="2" name="Title 1"/>
-          <p:cNvSpPr>
-            <a:spLocks noGrp="1"/>
-          </p:cNvSpPr>
-          <p:nvPr>
-            <p:ph type="title"/>
-          </p:nvPr>
-        </p:nvSpPr>
-        <p:spPr/>
-        <p:txBody>
-          <a:bodyPr>
-            <a:noAutofit/>
-          </a:bodyPr>
-          <a:lstStyle/>
-          <a:p>
-            <a:r>
-              <a:rPr lang="en-GB" sz="2800" dirty="0" smtClean="0"/>
-              <a:t>More evidence of narrow hole in &lt;1,0,0&gt; direction (DFT-predicted) from spherical cut.</a:t>
-            </a:r>
-            <a:endParaRPr lang="en-GB" sz="2800" dirty="0"/>
           </a:p>
         </p:txBody>
       </p:sp>
       <p:pic>
         <p:nvPicPr>
-          <p:cNvPr id="4" name="Picture 10"/>
+          <p:cNvPr id="1027" name="Picture 3"/>
           <p:cNvPicPr>
             <a:picLocks noChangeAspect="1" noChangeArrowheads="1"/>
           </p:cNvPicPr>
           <p:nvPr/>
         </p:nvPicPr>
         <p:blipFill>
-          <a:blip r:embed="rId2">
+          <a:blip r:embed="rId7" cstate="print">
             <a:extLst>
               <a:ext uri="{28A0092B-C50C-407E-A947-70E740481C1C}">
                 <a14:useLocalDpi xmlns:a14="http://schemas.microsoft.com/office/drawing/2010/main" val="0"/>
@@ -5503,8 +5266,8 @@
         </p:blipFill>
         <p:spPr bwMode="auto">
           <a:xfrm>
-            <a:off x="3315444" y="3788840"/>
-            <a:ext cx="2401432" cy="1800000"/>
+            <a:off x="3347864" y="4797352"/>
+            <a:ext cx="2401043" cy="1800000"/>
           </a:xfrm>
           <a:prstGeom prst="rect">
             <a:avLst/>
@@ -5544,16 +5307,176 @@
           </a:extLst>
         </p:spPr>
       </p:pic>
+      <p:sp>
+        <p:nvSpPr>
+          <p:cNvPr id="9" name="TextBox 8"/>
+          <p:cNvSpPr txBox="1"/>
+          <p:nvPr/>
+        </p:nvSpPr>
+        <p:spPr>
+          <a:xfrm>
+            <a:off x="3608864" y="4293096"/>
+            <a:ext cx="1879041" cy="646331"/>
+          </a:xfrm>
+          <a:prstGeom prst="rect">
+            <a:avLst/>
+          </a:prstGeom>
+          <a:noFill/>
+        </p:spPr>
+        <p:txBody>
+          <a:bodyPr wrap="none" rtlCol="0">
+            <a:spAutoFit/>
+          </a:bodyPr>
+          <a:lstStyle/>
+          <a:p>
+            <a:r>
+              <a:rPr lang="en-GB" i="1" dirty="0" smtClean="0"/>
+              <a:t>Fitted dispersion </a:t>
+            </a:r>
+          </a:p>
+          <a:p>
+            <a:r>
+              <a:rPr lang="en-GB" i="1" dirty="0" smtClean="0"/>
+              <a:t>|D|=</a:t>
+            </a:r>
+            <a:r>
+              <a:rPr lang="en-GB" dirty="0" smtClean="0"/>
+              <a:t>212 </a:t>
+            </a:r>
+            <a:r>
+              <a:rPr lang="en-GB" dirty="0" smtClean="0"/>
+              <a:t>[</a:t>
+            </a:r>
+            <a:r>
+              <a:rPr lang="en-GB" sz="1400" dirty="0" err="1" smtClean="0"/>
+              <a:t>meV</a:t>
+            </a:r>
+            <a:r>
+              <a:rPr lang="en-GB" sz="1400" dirty="0" smtClean="0"/>
+              <a:t>*</a:t>
+            </a:r>
+            <a:r>
+              <a:rPr lang="en-GB" sz="1400" dirty="0" smtClean="0">
+                <a:latin typeface="Symbol" panose="05050102010706020507" pitchFamily="18" charset="2"/>
+              </a:rPr>
+              <a:t>A</a:t>
+            </a:r>
+            <a:r>
+              <a:rPr lang="en-GB" sz="1400" baseline="30000" dirty="0" smtClean="0">
+                <a:latin typeface="Symbol" panose="05050102010706020507" pitchFamily="18" charset="2"/>
+              </a:rPr>
+              <a:t>-2</a:t>
+            </a:r>
+            <a:r>
+              <a:rPr lang="en-GB" dirty="0" smtClean="0"/>
+              <a:t>]</a:t>
+            </a:r>
+            <a:endParaRPr lang="en-GB" dirty="0"/>
+          </a:p>
+        </p:txBody>
+      </p:sp>
+      <p:sp>
+        <p:nvSpPr>
+          <p:cNvPr id="14" name="TextBox 13"/>
+          <p:cNvSpPr txBox="1"/>
+          <p:nvPr/>
+        </p:nvSpPr>
+        <p:spPr>
+          <a:xfrm>
+            <a:off x="6156176" y="4222829"/>
+            <a:ext cx="2583784" cy="646331"/>
+          </a:xfrm>
+          <a:prstGeom prst="rect">
+            <a:avLst/>
+          </a:prstGeom>
+          <a:noFill/>
+        </p:spPr>
+        <p:txBody>
+          <a:bodyPr wrap="none" rtlCol="0">
+            <a:spAutoFit/>
+          </a:bodyPr>
+          <a:lstStyle/>
+          <a:p>
+            <a:r>
+              <a:rPr lang="en-GB" dirty="0" smtClean="0"/>
+              <a:t>Intensity along dispersion</a:t>
+            </a:r>
+          </a:p>
+          <a:p>
+            <a:pPr algn="ctr"/>
+            <a:r>
+              <a:rPr lang="en-GB" dirty="0" smtClean="0"/>
+              <a:t>curve</a:t>
+            </a:r>
+            <a:endParaRPr lang="en-GB" dirty="0"/>
+          </a:p>
+        </p:txBody>
+      </p:sp>
+    </p:spTree>
+    <p:extLst>
+      <p:ext uri="{BB962C8B-B14F-4D97-AF65-F5344CB8AC3E}">
+        <p14:creationId xmlns:p14="http://schemas.microsoft.com/office/powerpoint/2010/main" val="3752755932"/>
+      </p:ext>
+    </p:extLst>
+  </p:cSld>
+  <p:clrMapOvr>
+    <a:masterClrMapping/>
+  </p:clrMapOvr>
+</p:sld>
+</file>
+
+<file path=ppt/slides/slide6.xml><?xml version="1.0" encoding="utf-8"?>
+<p:sld xmlns:a="http://schemas.openxmlformats.org/drawingml/2006/main" xmlns:r="http://schemas.openxmlformats.org/officeDocument/2006/relationships" xmlns:p="http://schemas.openxmlformats.org/presentationml/2006/main">
+  <p:cSld>
+    <p:spTree>
+      <p:nvGrpSpPr>
+        <p:cNvPr id="1" name=""/>
+        <p:cNvGrpSpPr/>
+        <p:nvPr/>
+      </p:nvGrpSpPr>
+      <p:grpSpPr>
+        <a:xfrm>
+          <a:off x="0" y="0"/>
+          <a:ext cx="0" cy="0"/>
+          <a:chOff x="0" y="0"/>
+          <a:chExt cx="0" cy="0"/>
+        </a:xfrm>
+      </p:grpSpPr>
+      <p:sp>
+        <p:nvSpPr>
+          <p:cNvPr id="2" name="Title 1"/>
+          <p:cNvSpPr>
+            <a:spLocks noGrp="1"/>
+          </p:cNvSpPr>
+          <p:nvPr>
+            <p:ph type="title"/>
+          </p:nvPr>
+        </p:nvSpPr>
+        <p:spPr/>
+        <p:txBody>
+          <a:bodyPr>
+            <a:normAutofit/>
+          </a:bodyPr>
+          <a:lstStyle/>
+          <a:p>
+            <a:r>
+              <a:rPr lang="en-GB" sz="2400" dirty="0" smtClean="0"/>
+              <a:t>Some evidence of narrow hole in &lt;1,0,0&gt; direction (DFT-predicted)?</a:t>
+            </a:r>
+            <a:endParaRPr lang="en-GB" sz="2400" dirty="0"/>
+          </a:p>
+        </p:txBody>
+      </p:sp>
       <p:pic>
         <p:nvPicPr>
-          <p:cNvPr id="5" name="Picture 9"/>
+          <p:cNvPr id="4" name="Picture 11"/>
           <p:cNvPicPr>
             <a:picLocks noChangeAspect="1" noChangeArrowheads="1"/>
           </p:cNvPicPr>
           <p:nvPr/>
         </p:nvPicPr>
         <p:blipFill>
-          <a:blip r:embed="rId3">
+          <a:blip r:embed="rId2" cstate="print">
             <a:extLst>
               <a:ext uri="{28A0092B-C50C-407E-A947-70E740481C1C}">
                 <a14:useLocalDpi xmlns:a14="http://schemas.microsoft.com/office/drawing/2010/main" val="0"/>
@@ -5567,8 +5490,8 @@
         </p:blipFill>
         <p:spPr bwMode="auto">
           <a:xfrm>
-            <a:off x="3356992" y="1700608"/>
-            <a:ext cx="2401432" cy="1800000"/>
+            <a:off x="1115616" y="2133176"/>
+            <a:ext cx="3443277" cy="2880000"/>
           </a:xfrm>
           <a:prstGeom prst="rect">
             <a:avLst/>
@@ -5610,14 +5533,14 @@
       </p:pic>
       <p:pic>
         <p:nvPicPr>
-          <p:cNvPr id="6" name="Picture 4"/>
+          <p:cNvPr id="5" name="Picture 13"/>
           <p:cNvPicPr>
             <a:picLocks noChangeAspect="1" noChangeArrowheads="1"/>
           </p:cNvPicPr>
           <p:nvPr/>
         </p:nvPicPr>
         <p:blipFill>
-          <a:blip r:embed="rId4">
+          <a:blip r:embed="rId3" cstate="print">
             <a:extLst>
               <a:ext uri="{28A0092B-C50C-407E-A947-70E740481C1C}">
                 <a14:useLocalDpi xmlns:a14="http://schemas.microsoft.com/office/drawing/2010/main" val="0"/>
@@ -5631,8 +5554,8 @@
         </p:blipFill>
         <p:spPr bwMode="auto">
           <a:xfrm>
-            <a:off x="740087" y="2147514"/>
-            <a:ext cx="2616905" cy="3600000"/>
+            <a:off x="4740248" y="2132856"/>
+            <a:ext cx="2752000" cy="2880000"/>
           </a:xfrm>
           <a:prstGeom prst="rect">
             <a:avLst/>
@@ -5672,6 +5595,457 @@
           </a:extLst>
         </p:spPr>
       </p:pic>
+      <p:cxnSp>
+        <p:nvCxnSpPr>
+          <p:cNvPr id="6" name="Straight Arrow Connector 5"/>
+          <p:cNvCxnSpPr/>
+          <p:nvPr/>
+        </p:nvCxnSpPr>
+        <p:spPr>
+          <a:xfrm>
+            <a:off x="4740248" y="3191775"/>
+            <a:ext cx="1631952" cy="323936"/>
+          </a:xfrm>
+          <a:prstGeom prst="straightConnector1">
+            <a:avLst/>
+          </a:prstGeom>
+          <a:ln>
+            <a:solidFill>
+              <a:srgbClr val="FF0000"/>
+            </a:solidFill>
+            <a:tailEnd type="arrow"/>
+          </a:ln>
+        </p:spPr>
+        <p:style>
+          <a:lnRef idx="1">
+            <a:schemeClr val="accent1"/>
+          </a:lnRef>
+          <a:fillRef idx="0">
+            <a:schemeClr val="accent1"/>
+          </a:fillRef>
+          <a:effectRef idx="0">
+            <a:schemeClr val="accent1"/>
+          </a:effectRef>
+          <a:fontRef idx="minor">
+            <a:schemeClr val="tx1"/>
+          </a:fontRef>
+        </p:style>
+      </p:cxnSp>
+      <p:cxnSp>
+        <p:nvCxnSpPr>
+          <p:cNvPr id="7" name="Straight Arrow Connector 6"/>
+          <p:cNvCxnSpPr/>
+          <p:nvPr/>
+        </p:nvCxnSpPr>
+        <p:spPr>
+          <a:xfrm flipH="1">
+            <a:off x="3450648" y="3191775"/>
+            <a:ext cx="1289600" cy="323936"/>
+          </a:xfrm>
+          <a:prstGeom prst="straightConnector1">
+            <a:avLst/>
+          </a:prstGeom>
+          <a:ln>
+            <a:solidFill>
+              <a:srgbClr val="FF0000"/>
+            </a:solidFill>
+            <a:tailEnd type="arrow"/>
+          </a:ln>
+        </p:spPr>
+        <p:style>
+          <a:lnRef idx="1">
+            <a:schemeClr val="accent1"/>
+          </a:lnRef>
+          <a:fillRef idx="0">
+            <a:schemeClr val="accent1"/>
+          </a:fillRef>
+          <a:effectRef idx="0">
+            <a:schemeClr val="accent1"/>
+          </a:effectRef>
+          <a:fontRef idx="minor">
+            <a:schemeClr val="tx1"/>
+          </a:fontRef>
+        </p:style>
+      </p:cxnSp>
+      <p:cxnSp>
+        <p:nvCxnSpPr>
+          <p:cNvPr id="11" name="Straight Arrow Connector 10"/>
+          <p:cNvCxnSpPr/>
+          <p:nvPr/>
+        </p:nvCxnSpPr>
+        <p:spPr>
+          <a:xfrm flipH="1">
+            <a:off x="2411760" y="3191775"/>
+            <a:ext cx="2328488" cy="1029313"/>
+          </a:xfrm>
+          <a:prstGeom prst="straightConnector1">
+            <a:avLst/>
+          </a:prstGeom>
+          <a:ln>
+            <a:solidFill>
+              <a:srgbClr val="FF0000"/>
+            </a:solidFill>
+            <a:tailEnd type="arrow"/>
+          </a:ln>
+        </p:spPr>
+        <p:style>
+          <a:lnRef idx="1">
+            <a:schemeClr val="accent1"/>
+          </a:lnRef>
+          <a:fillRef idx="0">
+            <a:schemeClr val="accent1"/>
+          </a:fillRef>
+          <a:effectRef idx="0">
+            <a:schemeClr val="accent1"/>
+          </a:effectRef>
+          <a:fontRef idx="minor">
+            <a:schemeClr val="tx1"/>
+          </a:fontRef>
+        </p:style>
+      </p:cxnSp>
+      <p:cxnSp>
+        <p:nvCxnSpPr>
+          <p:cNvPr id="13" name="Straight Arrow Connector 12"/>
+          <p:cNvCxnSpPr/>
+          <p:nvPr/>
+        </p:nvCxnSpPr>
+        <p:spPr>
+          <a:xfrm>
+            <a:off x="4740248" y="3191775"/>
+            <a:ext cx="1291275" cy="914233"/>
+          </a:xfrm>
+          <a:prstGeom prst="straightConnector1">
+            <a:avLst/>
+          </a:prstGeom>
+          <a:ln>
+            <a:solidFill>
+              <a:srgbClr val="FF0000"/>
+            </a:solidFill>
+            <a:tailEnd type="arrow"/>
+          </a:ln>
+        </p:spPr>
+        <p:style>
+          <a:lnRef idx="1">
+            <a:schemeClr val="accent1"/>
+          </a:lnRef>
+          <a:fillRef idx="0">
+            <a:schemeClr val="accent1"/>
+          </a:fillRef>
+          <a:effectRef idx="0">
+            <a:schemeClr val="accent1"/>
+          </a:effectRef>
+          <a:fontRef idx="minor">
+            <a:schemeClr val="tx1"/>
+          </a:fontRef>
+        </p:style>
+      </p:cxnSp>
+      <p:sp>
+        <p:nvSpPr>
+          <p:cNvPr id="14" name="TextBox 13"/>
+          <p:cNvSpPr txBox="1"/>
+          <p:nvPr/>
+        </p:nvSpPr>
+        <p:spPr>
+          <a:xfrm>
+            <a:off x="4413207" y="2821578"/>
+            <a:ext cx="562975" cy="369332"/>
+          </a:xfrm>
+          <a:prstGeom prst="rect">
+            <a:avLst/>
+          </a:prstGeom>
+          <a:noFill/>
+        </p:spPr>
+        <p:txBody>
+          <a:bodyPr wrap="none" rtlCol="0">
+            <a:spAutoFit/>
+          </a:bodyPr>
+          <a:lstStyle/>
+          <a:p>
+            <a:r>
+              <a:rPr lang="en-GB" dirty="0" smtClean="0"/>
+              <a:t>Gap</a:t>
+            </a:r>
+            <a:endParaRPr lang="en-GB" dirty="0"/>
+          </a:p>
+        </p:txBody>
+      </p:sp>
+      <p:sp>
+        <p:nvSpPr>
+          <p:cNvPr id="17" name="TextBox 16"/>
+          <p:cNvSpPr txBox="1"/>
+          <p:nvPr/>
+        </p:nvSpPr>
+        <p:spPr>
+          <a:xfrm>
+            <a:off x="1547664" y="5157192"/>
+            <a:ext cx="2282356" cy="369332"/>
+          </a:xfrm>
+          <a:prstGeom prst="rect">
+            <a:avLst/>
+          </a:prstGeom>
+          <a:noFill/>
+        </p:spPr>
+        <p:txBody>
+          <a:bodyPr wrap="none" rtlCol="0">
+            <a:spAutoFit/>
+          </a:bodyPr>
+          <a:lstStyle/>
+          <a:p>
+            <a:r>
+              <a:rPr lang="en-GB" dirty="0" smtClean="0"/>
+              <a:t>Magnetic FF corrected</a:t>
+            </a:r>
+            <a:endParaRPr lang="en-GB" dirty="0"/>
+          </a:p>
+        </p:txBody>
+      </p:sp>
+    </p:spTree>
+    <p:extLst>
+      <p:ext uri="{BB962C8B-B14F-4D97-AF65-F5344CB8AC3E}">
+        <p14:creationId xmlns:p14="http://schemas.microsoft.com/office/powerpoint/2010/main" val="3533390486"/>
+      </p:ext>
+    </p:extLst>
+  </p:cSld>
+  <p:clrMapOvr>
+    <a:masterClrMapping/>
+  </p:clrMapOvr>
+</p:sld>
+</file>
+
+<file path=ppt/slides/slide7.xml><?xml version="1.0" encoding="utf-8"?>
+<p:sld xmlns:a="http://schemas.openxmlformats.org/drawingml/2006/main" xmlns:r="http://schemas.openxmlformats.org/officeDocument/2006/relationships" xmlns:p="http://schemas.openxmlformats.org/presentationml/2006/main">
+  <p:cSld>
+    <p:spTree>
+      <p:nvGrpSpPr>
+        <p:cNvPr id="1" name=""/>
+        <p:cNvGrpSpPr/>
+        <p:nvPr/>
+      </p:nvGrpSpPr>
+      <p:grpSpPr>
+        <a:xfrm>
+          <a:off x="0" y="0"/>
+          <a:ext cx="0" cy="0"/>
+          <a:chOff x="0" y="0"/>
+          <a:chExt cx="0" cy="0"/>
+        </a:xfrm>
+      </p:grpSpPr>
+      <p:sp>
+        <p:nvSpPr>
+          <p:cNvPr id="2" name="Title 1"/>
+          <p:cNvSpPr>
+            <a:spLocks noGrp="1"/>
+          </p:cNvSpPr>
+          <p:nvPr>
+            <p:ph type="title"/>
+          </p:nvPr>
+        </p:nvSpPr>
+        <p:spPr/>
+        <p:txBody>
+          <a:bodyPr>
+            <a:noAutofit/>
+          </a:bodyPr>
+          <a:lstStyle/>
+          <a:p>
+            <a:r>
+              <a:rPr lang="en-GB" sz="2800" dirty="0" smtClean="0"/>
+              <a:t>More evidence of narrow hole in &lt;1,0,0&gt; direction (DFT-predicted) from spherical cut.</a:t>
+            </a:r>
+            <a:endParaRPr lang="en-GB" sz="2800" dirty="0"/>
+          </a:p>
+        </p:txBody>
+      </p:sp>
+      <p:pic>
+        <p:nvPicPr>
+          <p:cNvPr id="4" name="Picture 10"/>
+          <p:cNvPicPr>
+            <a:picLocks noChangeAspect="1" noChangeArrowheads="1"/>
+          </p:cNvPicPr>
+          <p:nvPr/>
+        </p:nvPicPr>
+        <p:blipFill>
+          <a:blip r:embed="rId2">
+            <a:extLst>
+              <a:ext uri="{28A0092B-C50C-407E-A947-70E740481C1C}">
+                <a14:useLocalDpi xmlns:a14="http://schemas.microsoft.com/office/drawing/2010/main" val="0"/>
+              </a:ext>
+            </a:extLst>
+          </a:blip>
+          <a:srcRect/>
+          <a:stretch>
+            <a:fillRect/>
+          </a:stretch>
+        </p:blipFill>
+        <p:spPr bwMode="auto">
+          <a:xfrm>
+            <a:off x="3315444" y="3788840"/>
+            <a:ext cx="2401432" cy="1800000"/>
+          </a:xfrm>
+          <a:prstGeom prst="rect">
+            <a:avLst/>
+          </a:prstGeom>
+          <a:noFill/>
+          <a:ln>
+            <a:noFill/>
+          </a:ln>
+          <a:effectLst/>
+          <a:extLst>
+            <a:ext uri="{909E8E84-426E-40DD-AFC4-6F175D3DCCD1}">
+              <a14:hiddenFill xmlns:a14="http://schemas.microsoft.com/office/drawing/2010/main">
+                <a:solidFill>
+                  <a:schemeClr val="accent1"/>
+                </a:solidFill>
+              </a14:hiddenFill>
+            </a:ext>
+            <a:ext uri="{91240B29-F687-4F45-9708-019B960494DF}">
+              <a14:hiddenLine xmlns:a14="http://schemas.microsoft.com/office/drawing/2010/main" w="9525">
+                <a:solidFill>
+                  <a:schemeClr val="tx1"/>
+                </a:solidFill>
+                <a:miter lim="800000"/>
+                <a:headEnd/>
+                <a:tailEnd/>
+              </a14:hiddenLine>
+            </a:ext>
+            <a:ext uri="{AF507438-7753-43E0-B8FC-AC1667EBCBE1}">
+              <a14:hiddenEffects xmlns:a14="http://schemas.microsoft.com/office/drawing/2010/main">
+                <a:effectLst>
+                  <a:outerShdw dist="35921" dir="2700000" algn="ctr" rotWithShape="0">
+                    <a:schemeClr val="bg2"/>
+                  </a:outerShdw>
+                </a:effectLst>
+              </a14:hiddenEffects>
+            </a:ext>
+          </a:extLst>
+        </p:spPr>
+      </p:pic>
+      <p:pic>
+        <p:nvPicPr>
+          <p:cNvPr id="5" name="Picture 9"/>
+          <p:cNvPicPr>
+            <a:picLocks noChangeAspect="1" noChangeArrowheads="1"/>
+          </p:cNvPicPr>
+          <p:nvPr/>
+        </p:nvPicPr>
+        <p:blipFill>
+          <a:blip r:embed="rId3">
+            <a:extLst>
+              <a:ext uri="{28A0092B-C50C-407E-A947-70E740481C1C}">
+                <a14:useLocalDpi xmlns:a14="http://schemas.microsoft.com/office/drawing/2010/main" val="0"/>
+              </a:ext>
+            </a:extLst>
+          </a:blip>
+          <a:srcRect/>
+          <a:stretch>
+            <a:fillRect/>
+          </a:stretch>
+        </p:blipFill>
+        <p:spPr bwMode="auto">
+          <a:xfrm>
+            <a:off x="3356992" y="1700608"/>
+            <a:ext cx="2401432" cy="1800000"/>
+          </a:xfrm>
+          <a:prstGeom prst="rect">
+            <a:avLst/>
+          </a:prstGeom>
+          <a:noFill/>
+          <a:ln>
+            <a:noFill/>
+          </a:ln>
+          <a:effectLst/>
+          <a:extLst>
+            <a:ext uri="{909E8E84-426E-40DD-AFC4-6F175D3DCCD1}">
+              <a14:hiddenFill xmlns:a14="http://schemas.microsoft.com/office/drawing/2010/main">
+                <a:solidFill>
+                  <a:schemeClr val="accent1"/>
+                </a:solidFill>
+              </a14:hiddenFill>
+            </a:ext>
+            <a:ext uri="{91240B29-F687-4F45-9708-019B960494DF}">
+              <a14:hiddenLine xmlns:a14="http://schemas.microsoft.com/office/drawing/2010/main" w="9525">
+                <a:solidFill>
+                  <a:schemeClr val="tx1"/>
+                </a:solidFill>
+                <a:miter lim="800000"/>
+                <a:headEnd/>
+                <a:tailEnd/>
+              </a14:hiddenLine>
+            </a:ext>
+            <a:ext uri="{AF507438-7753-43E0-B8FC-AC1667EBCBE1}">
+              <a14:hiddenEffects xmlns:a14="http://schemas.microsoft.com/office/drawing/2010/main">
+                <a:effectLst>
+                  <a:outerShdw dist="35921" dir="2700000" algn="ctr" rotWithShape="0">
+                    <a:schemeClr val="bg2"/>
+                  </a:outerShdw>
+                </a:effectLst>
+              </a14:hiddenEffects>
+            </a:ext>
+          </a:extLst>
+        </p:spPr>
+      </p:pic>
+      <p:pic>
+        <p:nvPicPr>
+          <p:cNvPr id="6" name="Picture 4"/>
+          <p:cNvPicPr>
+            <a:picLocks noChangeAspect="1" noChangeArrowheads="1"/>
+          </p:cNvPicPr>
+          <p:nvPr/>
+        </p:nvPicPr>
+        <p:blipFill>
+          <a:blip r:embed="rId4">
+            <a:extLst>
+              <a:ext uri="{28A0092B-C50C-407E-A947-70E740481C1C}">
+                <a14:useLocalDpi xmlns:a14="http://schemas.microsoft.com/office/drawing/2010/main" val="0"/>
+              </a:ext>
+            </a:extLst>
+          </a:blip>
+          <a:srcRect/>
+          <a:stretch>
+            <a:fillRect/>
+          </a:stretch>
+        </p:blipFill>
+        <p:spPr bwMode="auto">
+          <a:xfrm>
+            <a:off x="740087" y="2147514"/>
+            <a:ext cx="2616905" cy="3600000"/>
+          </a:xfrm>
+          <a:prstGeom prst="rect">
+            <a:avLst/>
+          </a:prstGeom>
+          <a:noFill/>
+          <a:ln>
+            <a:noFill/>
+          </a:ln>
+          <a:effectLst/>
+          <a:extLst>
+            <a:ext uri="{909E8E84-426E-40DD-AFC4-6F175D3DCCD1}">
+              <a14:hiddenFill xmlns:a14="http://schemas.microsoft.com/office/drawing/2010/main">
+                <a:solidFill>
+                  <a:schemeClr val="accent1"/>
+                </a:solidFill>
+              </a14:hiddenFill>
+            </a:ext>
+            <a:ext uri="{91240B29-F687-4F45-9708-019B960494DF}">
+              <a14:hiddenLine xmlns:a14="http://schemas.microsoft.com/office/drawing/2010/main" w="9525">
+                <a:solidFill>
+                  <a:schemeClr val="tx1"/>
+                </a:solidFill>
+                <a:miter lim="800000"/>
+                <a:headEnd/>
+                <a:tailEnd/>
+              </a14:hiddenLine>
+            </a:ext>
+            <a:ext uri="{AF507438-7753-43E0-B8FC-AC1667EBCBE1}">
+              <a14:hiddenEffects xmlns:a14="http://schemas.microsoft.com/office/drawing/2010/main">
+                <a:effectLst>
+                  <a:outerShdw dist="35921" dir="2700000" algn="ctr" rotWithShape="0">
+                    <a:schemeClr val="bg2"/>
+                  </a:outerShdw>
+                </a:effectLst>
+              </a14:hiddenEffects>
+            </a:ext>
+          </a:extLst>
+        </p:spPr>
+      </p:pic>
       <p:sp>
         <p:nvSpPr>
           <p:cNvPr id="7" name="Rectangle 6"/>
@@ -5779,6 +6153,9 @@
             <a:avLst/>
           </a:prstGeom>
           <a:ln>
+            <a:solidFill>
+              <a:srgbClr val="FF0000"/>
+            </a:solidFill>
             <a:tailEnd type="arrow"/>
           </a:ln>
         </p:spPr>
@@ -5812,6 +6189,9 @@
             <a:avLst/>
           </a:prstGeom>
           <a:ln>
+            <a:solidFill>
+              <a:srgbClr val="FF0000"/>
+            </a:solidFill>
             <a:tailEnd type="arrow"/>
           </a:ln>
         </p:spPr>
@@ -5894,6 +6274,74 @@
           </a:extLst>
         </p:spPr>
       </p:pic>
+      <p:cxnSp>
+        <p:nvCxnSpPr>
+          <p:cNvPr id="12" name="Straight Arrow Connector 11"/>
+          <p:cNvCxnSpPr>
+            <a:stCxn id="5" idx="3"/>
+          </p:cNvCxnSpPr>
+          <p:nvPr/>
+        </p:nvCxnSpPr>
+        <p:spPr>
+          <a:xfrm>
+            <a:off x="5758424" y="2600608"/>
+            <a:ext cx="901808" cy="1476464"/>
+          </a:xfrm>
+          <a:prstGeom prst="straightConnector1">
+            <a:avLst/>
+          </a:prstGeom>
+          <a:ln>
+            <a:tailEnd type="arrow"/>
+          </a:ln>
+        </p:spPr>
+        <p:style>
+          <a:lnRef idx="1">
+            <a:schemeClr val="accent1"/>
+          </a:lnRef>
+          <a:fillRef idx="0">
+            <a:schemeClr val="accent1"/>
+          </a:fillRef>
+          <a:effectRef idx="0">
+            <a:schemeClr val="accent1"/>
+          </a:effectRef>
+          <a:fontRef idx="minor">
+            <a:schemeClr val="tx1"/>
+          </a:fontRef>
+        </p:style>
+      </p:cxnSp>
+      <p:cxnSp>
+        <p:nvCxnSpPr>
+          <p:cNvPr id="15" name="Straight Arrow Connector 14"/>
+          <p:cNvCxnSpPr/>
+          <p:nvPr/>
+        </p:nvCxnSpPr>
+        <p:spPr>
+          <a:xfrm flipV="1">
+            <a:off x="5608970" y="3947514"/>
+            <a:ext cx="1915358" cy="849638"/>
+          </a:xfrm>
+          <a:prstGeom prst="straightConnector1">
+            <a:avLst/>
+          </a:prstGeom>
+          <a:ln>
+            <a:tailEnd type="arrow"/>
+          </a:ln>
+        </p:spPr>
+        <p:style>
+          <a:lnRef idx="1">
+            <a:schemeClr val="accent1"/>
+          </a:lnRef>
+          <a:fillRef idx="0">
+            <a:schemeClr val="accent1"/>
+          </a:fillRef>
+          <a:effectRef idx="0">
+            <a:schemeClr val="accent1"/>
+          </a:effectRef>
+          <a:fontRef idx="minor">
+            <a:schemeClr val="tx1"/>
+          </a:fontRef>
+        </p:style>
+      </p:cxnSp>
     </p:spTree>
     <p:extLst>
       <p:ext uri="{BB962C8B-B14F-4D97-AF65-F5344CB8AC3E}">

</xml_diff>

<commit_message>
Minor changes at recall on what to do with Fe
</commit_message>
<xml_diff>
--- a/SpinWaveExcitationsInFe.pptx
+++ b/SpinWaveExcitationsInFe.pptx
@@ -294,7 +294,7 @@
           <a:p>
             <a:fld id="{2BB24526-D561-41AA-952F-4B4451167233}" type="datetimeFigureOut">
               <a:rPr lang="en-GB" smtClean="0"/>
-              <a:t>27/07/2015</a:t>
+              <a:t>16/10/2015</a:t>
             </a:fld>
             <a:endParaRPr lang="en-GB"/>
           </a:p>
@@ -464,7 +464,7 @@
           <a:p>
             <a:fld id="{2BB24526-D561-41AA-952F-4B4451167233}" type="datetimeFigureOut">
               <a:rPr lang="en-GB" smtClean="0"/>
-              <a:t>27/07/2015</a:t>
+              <a:t>16/10/2015</a:t>
             </a:fld>
             <a:endParaRPr lang="en-GB"/>
           </a:p>
@@ -644,7 +644,7 @@
           <a:p>
             <a:fld id="{2BB24526-D561-41AA-952F-4B4451167233}" type="datetimeFigureOut">
               <a:rPr lang="en-GB" smtClean="0"/>
-              <a:t>27/07/2015</a:t>
+              <a:t>16/10/2015</a:t>
             </a:fld>
             <a:endParaRPr lang="en-GB"/>
           </a:p>
@@ -814,7 +814,7 @@
           <a:p>
             <a:fld id="{2BB24526-D561-41AA-952F-4B4451167233}" type="datetimeFigureOut">
               <a:rPr lang="en-GB" smtClean="0"/>
-              <a:t>27/07/2015</a:t>
+              <a:t>16/10/2015</a:t>
             </a:fld>
             <a:endParaRPr lang="en-GB"/>
           </a:p>
@@ -1060,7 +1060,7 @@
           <a:p>
             <a:fld id="{2BB24526-D561-41AA-952F-4B4451167233}" type="datetimeFigureOut">
               <a:rPr lang="en-GB" smtClean="0"/>
-              <a:t>27/07/2015</a:t>
+              <a:t>16/10/2015</a:t>
             </a:fld>
             <a:endParaRPr lang="en-GB"/>
           </a:p>
@@ -1348,7 +1348,7 @@
           <a:p>
             <a:fld id="{2BB24526-D561-41AA-952F-4B4451167233}" type="datetimeFigureOut">
               <a:rPr lang="en-GB" smtClean="0"/>
-              <a:t>27/07/2015</a:t>
+              <a:t>16/10/2015</a:t>
             </a:fld>
             <a:endParaRPr lang="en-GB"/>
           </a:p>
@@ -1770,7 +1770,7 @@
           <a:p>
             <a:fld id="{2BB24526-D561-41AA-952F-4B4451167233}" type="datetimeFigureOut">
               <a:rPr lang="en-GB" smtClean="0"/>
-              <a:t>27/07/2015</a:t>
+              <a:t>16/10/2015</a:t>
             </a:fld>
             <a:endParaRPr lang="en-GB"/>
           </a:p>
@@ -1888,7 +1888,7 @@
           <a:p>
             <a:fld id="{2BB24526-D561-41AA-952F-4B4451167233}" type="datetimeFigureOut">
               <a:rPr lang="en-GB" smtClean="0"/>
-              <a:t>27/07/2015</a:t>
+              <a:t>16/10/2015</a:t>
             </a:fld>
             <a:endParaRPr lang="en-GB"/>
           </a:p>
@@ -1983,7 +1983,7 @@
           <a:p>
             <a:fld id="{2BB24526-D561-41AA-952F-4B4451167233}" type="datetimeFigureOut">
               <a:rPr lang="en-GB" smtClean="0"/>
-              <a:t>27/07/2015</a:t>
+              <a:t>16/10/2015</a:t>
             </a:fld>
             <a:endParaRPr lang="en-GB"/>
           </a:p>
@@ -2260,7 +2260,7 @@
           <a:p>
             <a:fld id="{2BB24526-D561-41AA-952F-4B4451167233}" type="datetimeFigureOut">
               <a:rPr lang="en-GB" smtClean="0"/>
-              <a:t>27/07/2015</a:t>
+              <a:t>16/10/2015</a:t>
             </a:fld>
             <a:endParaRPr lang="en-GB"/>
           </a:p>
@@ -2513,7 +2513,7 @@
           <a:p>
             <a:fld id="{2BB24526-D561-41AA-952F-4B4451167233}" type="datetimeFigureOut">
               <a:rPr lang="en-GB" smtClean="0"/>
-              <a:t>27/07/2015</a:t>
+              <a:t>16/10/2015</a:t>
             </a:fld>
             <a:endParaRPr lang="en-GB"/>
           </a:p>
@@ -2726,7 +2726,7 @@
           <a:p>
             <a:fld id="{2BB24526-D561-41AA-952F-4B4451167233}" type="datetimeFigureOut">
               <a:rPr lang="en-GB" smtClean="0"/>
-              <a:t>27/07/2015</a:t>
+              <a:t>16/10/2015</a:t>
             </a:fld>
             <a:endParaRPr lang="en-GB"/>
           </a:p>
@@ -4910,15 +4910,7 @@
           <a:p>
             <a:r>
               <a:rPr lang="en-GB" dirty="0" smtClean="0"/>
-              <a:t>Bragg 200, Directions </a:t>
-            </a:r>
-            <a:r>
-              <a:rPr lang="en-GB" dirty="0" smtClean="0"/>
-              <a:t>&lt;100&gt; </a:t>
-            </a:r>
-            <a:r>
-              <a:rPr lang="en-GB" dirty="0" smtClean="0"/>
-              <a:t>(</a:t>
+              <a:t>Bragg 200, Directions &lt;100&gt; (</a:t>
             </a:r>
             <a:r>
               <a:rPr lang="en-GB" dirty="0" smtClean="0">
@@ -5139,15 +5131,7 @@
           <a:p>
             <a:r>
               <a:rPr lang="en-GB" dirty="0" smtClean="0"/>
-              <a:t>Bragg 200, Directions </a:t>
-            </a:r>
-            <a:r>
-              <a:rPr lang="en-GB" dirty="0" smtClean="0"/>
-              <a:t>&lt;110&gt; </a:t>
-            </a:r>
-            <a:r>
-              <a:rPr lang="en-GB" dirty="0" smtClean="0"/>
-              <a:t>(</a:t>
+              <a:t>Bragg 200, Directions &lt;110&gt; (</a:t>
             </a:r>
             <a:r>
               <a:rPr lang="en-GB" dirty="0" smtClean="0">
@@ -5341,11 +5325,7 @@
             </a:r>
             <a:r>
               <a:rPr lang="en-GB" dirty="0" smtClean="0"/>
-              <a:t>212 </a:t>
-            </a:r>
-            <a:r>
-              <a:rPr lang="en-GB" dirty="0" smtClean="0"/>
-              <a:t>[</a:t>
+              <a:t>212 [</a:t>
             </a:r>
             <a:r>
               <a:rPr lang="en-GB" sz="1400" dirty="0" err="1" smtClean="0"/>
@@ -6312,13 +6292,15 @@
       <p:cxnSp>
         <p:nvCxnSpPr>
           <p:cNvPr id="15" name="Straight Arrow Connector 14"/>
-          <p:cNvCxnSpPr/>
+          <p:cNvCxnSpPr>
+            <a:stCxn id="13" idx="1"/>
+          </p:cNvCxnSpPr>
           <p:nvPr/>
         </p:nvCxnSpPr>
         <p:spPr>
           <a:xfrm flipV="1">
-            <a:off x="5608970" y="3947514"/>
-            <a:ext cx="1915358" cy="849638"/>
+            <a:off x="5612490" y="3947514"/>
+            <a:ext cx="1911838" cy="813634"/>
           </a:xfrm>
           <a:prstGeom prst="straightConnector1">
             <a:avLst/>
@@ -6342,6 +6324,88 @@
           </a:fontRef>
         </p:style>
       </p:cxnSp>
+      <p:sp>
+        <p:nvSpPr>
+          <p:cNvPr id="3" name="Right Brace 2"/>
+          <p:cNvSpPr/>
+          <p:nvPr/>
+        </p:nvSpPr>
+        <p:spPr>
+          <a:xfrm>
+            <a:off x="5508104" y="1844824"/>
+            <a:ext cx="208772" cy="1494016"/>
+          </a:xfrm>
+          <a:prstGeom prst="rightBrace">
+            <a:avLst/>
+          </a:prstGeom>
+          <a:ln>
+            <a:tailEnd type="none"/>
+          </a:ln>
+        </p:spPr>
+        <p:style>
+          <a:lnRef idx="1">
+            <a:schemeClr val="accent1"/>
+          </a:lnRef>
+          <a:fillRef idx="0">
+            <a:schemeClr val="accent1"/>
+          </a:fillRef>
+          <a:effectRef idx="0">
+            <a:schemeClr val="accent1"/>
+          </a:effectRef>
+          <a:fontRef idx="minor">
+            <a:schemeClr val="tx1"/>
+          </a:fontRef>
+        </p:style>
+        <p:txBody>
+          <a:bodyPr rtlCol="0" anchor="ctr"/>
+          <a:lstStyle/>
+          <a:p>
+            <a:pPr algn="ctr"/>
+            <a:endParaRPr lang="en-GB"/>
+          </a:p>
+        </p:txBody>
+      </p:sp>
+      <p:sp>
+        <p:nvSpPr>
+          <p:cNvPr id="13" name="Right Brace 12"/>
+          <p:cNvSpPr/>
+          <p:nvPr/>
+        </p:nvSpPr>
+        <p:spPr>
+          <a:xfrm>
+            <a:off x="5436096" y="4077072"/>
+            <a:ext cx="176394" cy="1368152"/>
+          </a:xfrm>
+          <a:prstGeom prst="rightBrace">
+            <a:avLst/>
+          </a:prstGeom>
+          <a:ln>
+            <a:tailEnd type="none"/>
+          </a:ln>
+        </p:spPr>
+        <p:style>
+          <a:lnRef idx="1">
+            <a:schemeClr val="accent1"/>
+          </a:lnRef>
+          <a:fillRef idx="0">
+            <a:schemeClr val="accent1"/>
+          </a:fillRef>
+          <a:effectRef idx="0">
+            <a:schemeClr val="accent1"/>
+          </a:effectRef>
+          <a:fontRef idx="minor">
+            <a:schemeClr val="tx1"/>
+          </a:fontRef>
+        </p:style>
+        <p:txBody>
+          <a:bodyPr rtlCol="0" anchor="ctr"/>
+          <a:lstStyle/>
+          <a:p>
+            <a:pPr algn="ctr"/>
+            <a:endParaRPr lang="en-GB"/>
+          </a:p>
+        </p:txBody>
+      </p:sp>
     </p:spTree>
     <p:extLst>
       <p:ext uri="{BB962C8B-B14F-4D97-AF65-F5344CB8AC3E}">

</xml_diff>

<commit_message>
Fe summary. 08/01/2016 Toby discussed
</commit_message>
<xml_diff>
--- a/SpinWaveExcitationsInFe.pptx
+++ b/SpinWaveExcitationsInFe.pptx
@@ -294,7 +294,7 @@
           <a:p>
             <a:fld id="{2BB24526-D561-41AA-952F-4B4451167233}" type="datetimeFigureOut">
               <a:rPr lang="en-GB" smtClean="0"/>
-              <a:t>16/10/2015</a:t>
+              <a:t>08/01/2016</a:t>
             </a:fld>
             <a:endParaRPr lang="en-GB"/>
           </a:p>
@@ -464,7 +464,7 @@
           <a:p>
             <a:fld id="{2BB24526-D561-41AA-952F-4B4451167233}" type="datetimeFigureOut">
               <a:rPr lang="en-GB" smtClean="0"/>
-              <a:t>16/10/2015</a:t>
+              <a:t>08/01/2016</a:t>
             </a:fld>
             <a:endParaRPr lang="en-GB"/>
           </a:p>
@@ -644,7 +644,7 @@
           <a:p>
             <a:fld id="{2BB24526-D561-41AA-952F-4B4451167233}" type="datetimeFigureOut">
               <a:rPr lang="en-GB" smtClean="0"/>
-              <a:t>16/10/2015</a:t>
+              <a:t>08/01/2016</a:t>
             </a:fld>
             <a:endParaRPr lang="en-GB"/>
           </a:p>
@@ -814,7 +814,7 @@
           <a:p>
             <a:fld id="{2BB24526-D561-41AA-952F-4B4451167233}" type="datetimeFigureOut">
               <a:rPr lang="en-GB" smtClean="0"/>
-              <a:t>16/10/2015</a:t>
+              <a:t>08/01/2016</a:t>
             </a:fld>
             <a:endParaRPr lang="en-GB"/>
           </a:p>
@@ -1060,7 +1060,7 @@
           <a:p>
             <a:fld id="{2BB24526-D561-41AA-952F-4B4451167233}" type="datetimeFigureOut">
               <a:rPr lang="en-GB" smtClean="0"/>
-              <a:t>16/10/2015</a:t>
+              <a:t>08/01/2016</a:t>
             </a:fld>
             <a:endParaRPr lang="en-GB"/>
           </a:p>
@@ -1348,7 +1348,7 @@
           <a:p>
             <a:fld id="{2BB24526-D561-41AA-952F-4B4451167233}" type="datetimeFigureOut">
               <a:rPr lang="en-GB" smtClean="0"/>
-              <a:t>16/10/2015</a:t>
+              <a:t>08/01/2016</a:t>
             </a:fld>
             <a:endParaRPr lang="en-GB"/>
           </a:p>
@@ -1770,7 +1770,7 @@
           <a:p>
             <a:fld id="{2BB24526-D561-41AA-952F-4B4451167233}" type="datetimeFigureOut">
               <a:rPr lang="en-GB" smtClean="0"/>
-              <a:t>16/10/2015</a:t>
+              <a:t>08/01/2016</a:t>
             </a:fld>
             <a:endParaRPr lang="en-GB"/>
           </a:p>
@@ -1888,7 +1888,7 @@
           <a:p>
             <a:fld id="{2BB24526-D561-41AA-952F-4B4451167233}" type="datetimeFigureOut">
               <a:rPr lang="en-GB" smtClean="0"/>
-              <a:t>16/10/2015</a:t>
+              <a:t>08/01/2016</a:t>
             </a:fld>
             <a:endParaRPr lang="en-GB"/>
           </a:p>
@@ -1983,7 +1983,7 @@
           <a:p>
             <a:fld id="{2BB24526-D561-41AA-952F-4B4451167233}" type="datetimeFigureOut">
               <a:rPr lang="en-GB" smtClean="0"/>
-              <a:t>16/10/2015</a:t>
+              <a:t>08/01/2016</a:t>
             </a:fld>
             <a:endParaRPr lang="en-GB"/>
           </a:p>
@@ -2260,7 +2260,7 @@
           <a:p>
             <a:fld id="{2BB24526-D561-41AA-952F-4B4451167233}" type="datetimeFigureOut">
               <a:rPr lang="en-GB" smtClean="0"/>
-              <a:t>16/10/2015</a:t>
+              <a:t>08/01/2016</a:t>
             </a:fld>
             <a:endParaRPr lang="en-GB"/>
           </a:p>
@@ -2513,7 +2513,7 @@
           <a:p>
             <a:fld id="{2BB24526-D561-41AA-952F-4B4451167233}" type="datetimeFigureOut">
               <a:rPr lang="en-GB" smtClean="0"/>
-              <a:t>16/10/2015</a:t>
+              <a:t>08/01/2016</a:t>
             </a:fld>
             <a:endParaRPr lang="en-GB"/>
           </a:p>
@@ -2726,7 +2726,7 @@
           <a:p>
             <a:fld id="{2BB24526-D561-41AA-952F-4B4451167233}" type="datetimeFigureOut">
               <a:rPr lang="en-GB" smtClean="0"/>
-              <a:t>16/10/2015</a:t>
+              <a:t>08/01/2016</a:t>
             </a:fld>
             <a:endParaRPr lang="en-GB"/>
           </a:p>

</xml_diff>

<commit_message>
Typo -- renamed intencity to intensity
</commit_message>
<xml_diff>
--- a/SpinWaveExcitationsInFe.pptx
+++ b/SpinWaveExcitationsInFe.pptx
@@ -294,7 +294,7 @@
           <a:p>
             <a:fld id="{2BB24526-D561-41AA-952F-4B4451167233}" type="datetimeFigureOut">
               <a:rPr lang="en-GB" smtClean="0"/>
-              <a:t>08/01/2016</a:t>
+              <a:t>14/06/2016</a:t>
             </a:fld>
             <a:endParaRPr lang="en-GB"/>
           </a:p>
@@ -464,7 +464,7 @@
           <a:p>
             <a:fld id="{2BB24526-D561-41AA-952F-4B4451167233}" type="datetimeFigureOut">
               <a:rPr lang="en-GB" smtClean="0"/>
-              <a:t>08/01/2016</a:t>
+              <a:t>14/06/2016</a:t>
             </a:fld>
             <a:endParaRPr lang="en-GB"/>
           </a:p>
@@ -644,7 +644,7 @@
           <a:p>
             <a:fld id="{2BB24526-D561-41AA-952F-4B4451167233}" type="datetimeFigureOut">
               <a:rPr lang="en-GB" smtClean="0"/>
-              <a:t>08/01/2016</a:t>
+              <a:t>14/06/2016</a:t>
             </a:fld>
             <a:endParaRPr lang="en-GB"/>
           </a:p>
@@ -814,7 +814,7 @@
           <a:p>
             <a:fld id="{2BB24526-D561-41AA-952F-4B4451167233}" type="datetimeFigureOut">
               <a:rPr lang="en-GB" smtClean="0"/>
-              <a:t>08/01/2016</a:t>
+              <a:t>14/06/2016</a:t>
             </a:fld>
             <a:endParaRPr lang="en-GB"/>
           </a:p>
@@ -1060,7 +1060,7 @@
           <a:p>
             <a:fld id="{2BB24526-D561-41AA-952F-4B4451167233}" type="datetimeFigureOut">
               <a:rPr lang="en-GB" smtClean="0"/>
-              <a:t>08/01/2016</a:t>
+              <a:t>14/06/2016</a:t>
             </a:fld>
             <a:endParaRPr lang="en-GB"/>
           </a:p>
@@ -1348,7 +1348,7 @@
           <a:p>
             <a:fld id="{2BB24526-D561-41AA-952F-4B4451167233}" type="datetimeFigureOut">
               <a:rPr lang="en-GB" smtClean="0"/>
-              <a:t>08/01/2016</a:t>
+              <a:t>14/06/2016</a:t>
             </a:fld>
             <a:endParaRPr lang="en-GB"/>
           </a:p>
@@ -1770,7 +1770,7 @@
           <a:p>
             <a:fld id="{2BB24526-D561-41AA-952F-4B4451167233}" type="datetimeFigureOut">
               <a:rPr lang="en-GB" smtClean="0"/>
-              <a:t>08/01/2016</a:t>
+              <a:t>14/06/2016</a:t>
             </a:fld>
             <a:endParaRPr lang="en-GB"/>
           </a:p>
@@ -1888,7 +1888,7 @@
           <a:p>
             <a:fld id="{2BB24526-D561-41AA-952F-4B4451167233}" type="datetimeFigureOut">
               <a:rPr lang="en-GB" smtClean="0"/>
-              <a:t>08/01/2016</a:t>
+              <a:t>14/06/2016</a:t>
             </a:fld>
             <a:endParaRPr lang="en-GB"/>
           </a:p>
@@ -1983,7 +1983,7 @@
           <a:p>
             <a:fld id="{2BB24526-D561-41AA-952F-4B4451167233}" type="datetimeFigureOut">
               <a:rPr lang="en-GB" smtClean="0"/>
-              <a:t>08/01/2016</a:t>
+              <a:t>14/06/2016</a:t>
             </a:fld>
             <a:endParaRPr lang="en-GB"/>
           </a:p>
@@ -2260,7 +2260,7 @@
           <a:p>
             <a:fld id="{2BB24526-D561-41AA-952F-4B4451167233}" type="datetimeFigureOut">
               <a:rPr lang="en-GB" smtClean="0"/>
-              <a:t>08/01/2016</a:t>
+              <a:t>14/06/2016</a:t>
             </a:fld>
             <a:endParaRPr lang="en-GB"/>
           </a:p>
@@ -2513,7 +2513,7 @@
           <a:p>
             <a:fld id="{2BB24526-D561-41AA-952F-4B4451167233}" type="datetimeFigureOut">
               <a:rPr lang="en-GB" smtClean="0"/>
-              <a:t>08/01/2016</a:t>
+              <a:t>14/06/2016</a:t>
             </a:fld>
             <a:endParaRPr lang="en-GB"/>
           </a:p>
@@ -2726,7 +2726,7 @@
           <a:p>
             <a:fld id="{2BB24526-D561-41AA-952F-4B4451167233}" type="datetimeFigureOut">
               <a:rPr lang="en-GB" smtClean="0"/>
-              <a:t>08/01/2016</a:t>
+              <a:t>14/06/2016</a:t>
             </a:fld>
             <a:endParaRPr lang="en-GB"/>
           </a:p>

</xml_diff>